<commit_message>
correção na apresentação BANCO DE DADOS GEOGRAFICO.pptx
</commit_message>
<xml_diff>
--- a/Banco Geográfico/BANCO DE DADOS GEOGRAFICO.pptx
+++ b/Banco Geográfico/BANCO DE DADOS GEOGRAFICO.pptx
@@ -594,7 +594,7 @@
           <a:p>
             <a:fld id="{97BE2B42-0DA1-40E8-94A4-D339D326FD35}" type="datetimeFigureOut">
               <a:rPr lang="pt-BR" smtClean="0"/>
-              <a:t>02/10/2012</a:t>
+              <a:t>07/10/2012</a:t>
             </a:fld>
             <a:endParaRPr lang="pt-BR"/>
           </a:p>
@@ -759,7 +759,7 @@
           <a:p>
             <a:fld id="{97BE2B42-0DA1-40E8-94A4-D339D326FD35}" type="datetimeFigureOut">
               <a:rPr lang="pt-BR" smtClean="0"/>
-              <a:t>02/10/2012</a:t>
+              <a:t>07/10/2012</a:t>
             </a:fld>
             <a:endParaRPr lang="pt-BR"/>
           </a:p>
@@ -934,7 +934,7 @@
           <a:p>
             <a:fld id="{97BE2B42-0DA1-40E8-94A4-D339D326FD35}" type="datetimeFigureOut">
               <a:rPr lang="pt-BR" smtClean="0"/>
-              <a:t>02/10/2012</a:t>
+              <a:t>07/10/2012</a:t>
             </a:fld>
             <a:endParaRPr lang="pt-BR"/>
           </a:p>
@@ -1099,7 +1099,7 @@
           <a:p>
             <a:fld id="{97BE2B42-0DA1-40E8-94A4-D339D326FD35}" type="datetimeFigureOut">
               <a:rPr lang="pt-BR" smtClean="0"/>
-              <a:t>02/10/2012</a:t>
+              <a:t>07/10/2012</a:t>
             </a:fld>
             <a:endParaRPr lang="pt-BR"/>
           </a:p>
@@ -1652,7 +1652,7 @@
           <a:p>
             <a:fld id="{97BE2B42-0DA1-40E8-94A4-D339D326FD35}" type="datetimeFigureOut">
               <a:rPr lang="pt-BR" smtClean="0"/>
-              <a:t>02/10/2012</a:t>
+              <a:t>07/10/2012</a:t>
             </a:fld>
             <a:endParaRPr lang="pt-BR"/>
           </a:p>
@@ -1912,7 +1912,7 @@
           <a:p>
             <a:fld id="{97BE2B42-0DA1-40E8-94A4-D339D326FD35}" type="datetimeFigureOut">
               <a:rPr lang="pt-BR" smtClean="0"/>
-              <a:t>02/10/2012</a:t>
+              <a:t>07/10/2012</a:t>
             </a:fld>
             <a:endParaRPr lang="pt-BR"/>
           </a:p>
@@ -2400,7 +2400,7 @@
           <a:p>
             <a:fld id="{97BE2B42-0DA1-40E8-94A4-D339D326FD35}" type="datetimeFigureOut">
               <a:rPr lang="pt-BR" smtClean="0"/>
-              <a:t>02/10/2012</a:t>
+              <a:t>07/10/2012</a:t>
             </a:fld>
             <a:endParaRPr lang="pt-BR"/>
           </a:p>
@@ -2513,7 +2513,7 @@
           <a:p>
             <a:fld id="{97BE2B42-0DA1-40E8-94A4-D339D326FD35}" type="datetimeFigureOut">
               <a:rPr lang="pt-BR" smtClean="0"/>
-              <a:t>02/10/2012</a:t>
+              <a:t>07/10/2012</a:t>
             </a:fld>
             <a:endParaRPr lang="pt-BR"/>
           </a:p>
@@ -2603,7 +2603,7 @@
           <a:p>
             <a:fld id="{97BE2B42-0DA1-40E8-94A4-D339D326FD35}" type="datetimeFigureOut">
               <a:rPr lang="pt-BR" smtClean="0"/>
-              <a:t>02/10/2012</a:t>
+              <a:t>07/10/2012</a:t>
             </a:fld>
             <a:endParaRPr lang="pt-BR"/>
           </a:p>
@@ -3033,7 +3033,7 @@
           <a:p>
             <a:fld id="{97BE2B42-0DA1-40E8-94A4-D339D326FD35}" type="datetimeFigureOut">
               <a:rPr lang="pt-BR" smtClean="0"/>
-              <a:t>02/10/2012</a:t>
+              <a:t>07/10/2012</a:t>
             </a:fld>
             <a:endParaRPr lang="pt-BR"/>
           </a:p>
@@ -3566,7 +3566,7 @@
           <a:p>
             <a:fld id="{97BE2B42-0DA1-40E8-94A4-D339D326FD35}" type="datetimeFigureOut">
               <a:rPr lang="pt-BR" smtClean="0"/>
-              <a:t>02/10/2012</a:t>
+              <a:t>07/10/2012</a:t>
             </a:fld>
             <a:endParaRPr lang="pt-BR"/>
           </a:p>
@@ -4406,7 +4406,7 @@
           <a:p>
             <a:fld id="{97BE2B42-0DA1-40E8-94A4-D339D326FD35}" type="datetimeFigureOut">
               <a:rPr lang="pt-BR" smtClean="0"/>
-              <a:t>02/10/2012</a:t>
+              <a:t>07/10/2012</a:t>
             </a:fld>
             <a:endParaRPr lang="pt-BR"/>
           </a:p>
@@ -4865,7 +4865,6 @@
               <a:rPr lang="pt-BR" dirty="0" smtClean="0"/>
               <a:t>ENRIQUE cruz machado</a:t>
             </a:r>
-            <a:endParaRPr lang="pt-BR" dirty="0" smtClean="0"/>
           </a:p>
           <a:p>
             <a:r>
@@ -4874,11 +4873,7 @@
             </a:r>
             <a:r>
               <a:rPr lang="pt-BR" dirty="0" smtClean="0"/>
-              <a:t> </a:t>
-            </a:r>
-            <a:r>
-              <a:rPr lang="pt-BR" dirty="0" smtClean="0"/>
-              <a:t>BRAZ MONTEIRO</a:t>
+              <a:t> BRAZ MONTEIRO</a:t>
             </a:r>
           </a:p>
           <a:p>
@@ -5369,23 +5364,11 @@
           <a:p>
             <a:r>
               <a:rPr lang="pt-BR" sz="2400" b="0" dirty="0" smtClean="0"/>
-              <a:t>-endereço para </a:t>
-            </a:r>
-            <a:r>
-              <a:rPr lang="pt-BR" sz="2400" b="0" dirty="0" smtClean="0"/>
-              <a:t>downloads </a:t>
-            </a:r>
-            <a:r>
-              <a:rPr lang="pt-BR" sz="2400" b="0" dirty="0" smtClean="0"/>
-              <a:t>do </a:t>
+              <a:t>-endereço para downloads do </a:t>
             </a:r>
             <a:r>
               <a:rPr lang="pt-BR" sz="2400" b="0" dirty="0" err="1" smtClean="0"/>
-              <a:t>P</a:t>
-            </a:r>
-            <a:r>
-              <a:rPr lang="pt-BR" sz="2400" b="0" dirty="0" err="1" smtClean="0"/>
-              <a:t>ostGIS</a:t>
+              <a:t>PostGIS</a:t>
             </a:r>
             <a:endParaRPr lang="pt-BR" sz="2400" b="0" dirty="0" smtClean="0"/>
           </a:p>
@@ -5417,15 +5400,7 @@
             </a:r>
             <a:r>
               <a:rPr lang="pt-BR" sz="2400" b="0" dirty="0" smtClean="0"/>
-              <a:t>ter o </a:t>
-            </a:r>
-            <a:r>
-              <a:rPr lang="pt-BR" sz="2400" b="0" dirty="0" smtClean="0"/>
-              <a:t>instalado o PostgresSQL8.4 </a:t>
-            </a:r>
-            <a:r>
-              <a:rPr lang="pt-BR" sz="2400" b="0" dirty="0" smtClean="0"/>
-              <a:t>ou superior</a:t>
+              <a:t>ter o instalado o PostgresSQL8.4 ou superior</a:t>
             </a:r>
             <a:endParaRPr lang="pt-BR" sz="2400" b="0" dirty="0"/>
           </a:p>
@@ -5483,6 +5458,7 @@
           <a:bodyPr/>
           <a:lstStyle/>
           <a:p>
+            <a:pPr algn="r"/>
             <a:r>
               <a:rPr lang="pt-BR" dirty="0" smtClean="0"/>
               <a:t>WIZARD(i </a:t>
@@ -5924,8 +5900,8 @@
               <a:t>Criando um banco de dados </a:t>
             </a:r>
             <a:r>
-              <a:rPr lang="pt-BR" dirty="0" err="1" smtClean="0"/>
-              <a:t>geografico</a:t>
+              <a:rPr lang="pt-BR" dirty="0" smtClean="0"/>
+              <a:t>geográfico</a:t>
             </a:r>
             <a:endParaRPr lang="pt-BR" dirty="0"/>
           </a:p>
@@ -6227,7 +6203,7 @@
                   <a:srgbClr val="00B050"/>
                 </a:solidFill>
               </a:rPr>
-              <a:t>poem</a:t>
+              <a:t>poe</a:t>
             </a:r>
             <a:r>
               <a:rPr lang="pt-BR" b="0" dirty="0" smtClean="0">
@@ -7637,32 +7613,8 @@
           <a:lstStyle/>
           <a:p>
             <a:r>
-              <a:rPr lang="en-US" dirty="0"/>
-              <a:t>O </a:t>
-            </a:r>
-            <a:r>
-              <a:rPr lang="en-US" dirty="0" err="1"/>
-              <a:t>que</a:t>
-            </a:r>
-            <a:r>
-              <a:rPr lang="en-US" dirty="0"/>
-              <a:t> é um </a:t>
-            </a:r>
-            <a:r>
-              <a:rPr lang="en-US" dirty="0" err="1"/>
-              <a:t>banco</a:t>
-            </a:r>
-            <a:r>
-              <a:rPr lang="en-US" dirty="0"/>
-              <a:t> de dados </a:t>
-            </a:r>
-            <a:r>
-              <a:rPr lang="en-US" dirty="0" err="1" smtClean="0"/>
-              <a:t>geográfico</a:t>
-            </a:r>
-            <a:r>
-              <a:rPr lang="en-US" dirty="0"/>
-              <a:t>?</a:t>
+              <a:rPr lang="pt-BR" dirty="0" smtClean="0"/>
+              <a:t>O que é um banco de dados geográfico?</a:t>
             </a:r>
             <a:endParaRPr lang="pt-BR" dirty="0"/>
           </a:p>
@@ -7678,7 +7630,12 @@
             <p:ph idx="1"/>
           </p:nvPr>
         </p:nvSpPr>
-        <p:spPr/>
+        <p:spPr>
+          <a:xfrm>
+            <a:off x="899592" y="1124744"/>
+            <a:ext cx="7520940" cy="3579849"/>
+          </a:xfrm>
+        </p:spPr>
         <p:txBody>
           <a:bodyPr>
             <a:normAutofit/>
@@ -7689,84 +7646,33 @@
           </a:p>
           <a:p>
             <a:r>
-              <a:rPr lang="en-US" sz="2000" b="0" dirty="0" err="1" smtClean="0"/>
+              <a:rPr lang="pt-BR" sz="2000" b="0" dirty="0" smtClean="0"/>
               <a:t>Armazena</a:t>
             </a:r>
             <a:r>
               <a:rPr lang="en-US" sz="2000" b="0" dirty="0" smtClean="0"/>
-              <a:t> ,</a:t>
-            </a:r>
-            <a:r>
-              <a:rPr lang="en-US" sz="2000" b="0" dirty="0" err="1" smtClean="0"/>
+              <a:t>, </a:t>
+            </a:r>
+            <a:r>
+              <a:rPr lang="pt-BR" sz="2000" b="0" dirty="0" smtClean="0"/>
               <a:t>manipula</a:t>
-            </a:r>
-            <a:r>
-              <a:rPr lang="en-US" sz="2000" b="0" dirty="0" smtClean="0"/>
-              <a:t> e </a:t>
-            </a:r>
-            <a:r>
-              <a:rPr lang="en-US" sz="2000" b="0" dirty="0" err="1" smtClean="0"/>
-              <a:t>provê</a:t>
             </a:r>
             <a:r>
               <a:rPr lang="en-US" sz="2000" b="0" dirty="0" smtClean="0"/>
               <a:t> </a:t>
             </a:r>
             <a:r>
-              <a:rPr lang="en-US" sz="2000" b="0" dirty="0" err="1" smtClean="0"/>
-              <a:t>operaçoes</a:t>
-            </a:r>
-            <a:r>
               <a:rPr lang="en-US" sz="2000" b="0" dirty="0" smtClean="0"/>
-              <a:t> </a:t>
-            </a:r>
-            <a:r>
-              <a:rPr lang="en-US" sz="2000" b="0" dirty="0" err="1" smtClean="0"/>
-              <a:t>para</a:t>
+              <a:t>e </a:t>
             </a:r>
             <a:r>
               <a:rPr lang="en-US" sz="2000" b="0" dirty="0" smtClean="0"/>
-              <a:t> </a:t>
-            </a:r>
-            <a:r>
-              <a:rPr lang="en-US" sz="2000" b="0" dirty="0" err="1" smtClean="0"/>
-              <a:t>manipulação</a:t>
-            </a:r>
-            <a:r>
-              <a:rPr lang="en-US" sz="2000" b="0" dirty="0" smtClean="0"/>
-              <a:t> de </a:t>
-            </a:r>
-            <a:r>
-              <a:rPr lang="en-US" sz="2000" b="0" dirty="0" err="1" smtClean="0"/>
-              <a:t>objetos</a:t>
-            </a:r>
-            <a:r>
-              <a:rPr lang="en-US" sz="2000" b="0" dirty="0" smtClean="0"/>
-              <a:t> </a:t>
-            </a:r>
-            <a:r>
-              <a:rPr lang="en-US" sz="2000" b="0" dirty="0" err="1" smtClean="0"/>
-              <a:t>goegraficos</a:t>
-            </a:r>
-            <a:r>
-              <a:rPr lang="en-US" sz="2000" b="0" dirty="0"/>
-              <a:t> </a:t>
-            </a:r>
-            <a:r>
-              <a:rPr lang="en-US" sz="2000" b="0" dirty="0" err="1" smtClean="0"/>
-              <a:t>objetos</a:t>
-            </a:r>
-            <a:r>
-              <a:rPr lang="en-US" sz="2000" b="0" dirty="0" smtClean="0"/>
-              <a:t> </a:t>
-            </a:r>
-            <a:r>
-              <a:rPr lang="en-US" sz="2000" b="0" dirty="0" err="1" smtClean="0"/>
-              <a:t>geograficos</a:t>
-            </a:r>
-            <a:endParaRPr lang="en-US" sz="2000" b="0" dirty="0"/>
-          </a:p>
-          <a:p>
+              <a:t>prove </a:t>
+            </a:r>
+            <a:r>
+              <a:rPr lang="pt-BR" sz="2000" b="0" dirty="0" smtClean="0"/>
+              <a:t>operações para manipulação de objetos geográficos.</a:t>
+            </a:r>
             <a:endParaRPr lang="pt-BR" sz="2000" b="0" dirty="0" smtClean="0"/>
           </a:p>
           <a:p>
@@ -7774,20 +7680,24 @@
           </a:p>
           <a:p>
             <a:r>
-              <a:rPr lang="pt-BR" sz="2000" b="0" dirty="0" err="1" smtClean="0"/>
-              <a:t>Obs</a:t>
-            </a:r>
-            <a:r>
               <a:rPr lang="pt-BR" sz="2000" b="0" dirty="0" smtClean="0"/>
-              <a:t>: Ele </a:t>
-            </a:r>
-            <a:r>
-              <a:rPr lang="pt-BR" sz="2000" b="0" dirty="0" err="1" smtClean="0"/>
-              <a:t>tambem</a:t>
+              <a:t>Obs.: </a:t>
             </a:r>
             <a:r>
               <a:rPr lang="pt-BR" sz="2000" b="0" dirty="0" smtClean="0"/>
-              <a:t> manipula e armazena outros objetos do banco de dados</a:t>
+              <a:t>Ele </a:t>
+            </a:r>
+            <a:r>
+              <a:rPr lang="pt-BR" sz="2000" b="0" dirty="0" smtClean="0"/>
+              <a:t>também </a:t>
+            </a:r>
+            <a:r>
+              <a:rPr lang="pt-BR" sz="2000" b="0" dirty="0" smtClean="0"/>
+              <a:t>manipula e armazena outros objetos do banco de </a:t>
+            </a:r>
+            <a:r>
+              <a:rPr lang="pt-BR" sz="2000" b="0" dirty="0" smtClean="0"/>
+              <a:t>dados.</a:t>
             </a:r>
             <a:endParaRPr lang="pt-BR" sz="2000" b="0" dirty="0"/>
           </a:p>
@@ -8012,19 +7922,27 @@
               <a:t>O </a:t>
             </a:r>
             <a:r>
-              <a:rPr lang="en-US" dirty="0" err="1"/>
+              <a:rPr lang="pt-BR" dirty="0" smtClean="0"/>
               <a:t>que</a:t>
             </a:r>
             <a:r>
-              <a:rPr lang="en-US" dirty="0"/>
-              <a:t> é dado </a:t>
-            </a:r>
-            <a:r>
-              <a:rPr lang="en-US" i="1" dirty="0" err="1" smtClean="0"/>
+              <a:rPr lang="en-US" dirty="0" smtClean="0"/>
+              <a:t> </a:t>
+            </a:r>
+            <a:r>
+              <a:rPr lang="pt-BR" dirty="0" smtClean="0"/>
+              <a:t>são</a:t>
+            </a:r>
+            <a:r>
+              <a:rPr lang="en-US" dirty="0" smtClean="0"/>
+              <a:t> dados </a:t>
+            </a:r>
+            <a:r>
+              <a:rPr lang="pt-BR" i="1" dirty="0" smtClean="0"/>
               <a:t>geográfico</a:t>
             </a:r>
             <a:r>
-              <a:rPr lang="en-US" dirty="0"/>
+              <a:rPr lang="en-US" dirty="0" smtClean="0"/>
               <a:t>?</a:t>
             </a:r>
             <a:endParaRPr lang="pt-BR" dirty="0"/>
@@ -8053,7 +7971,7 @@
           <a:p>
             <a:r>
               <a:rPr lang="pt-BR" sz="3200" b="0" dirty="0" smtClean="0"/>
-              <a:t>É </a:t>
+              <a:t>	É </a:t>
             </a:r>
             <a:r>
               <a:rPr lang="pt-BR" sz="3200" b="0" dirty="0"/>
@@ -8119,27 +8037,31 @@
               <a:t>Como </a:t>
             </a:r>
             <a:r>
-              <a:rPr lang="en-US" dirty="0" err="1" smtClean="0"/>
+              <a:rPr lang="pt-BR" dirty="0" smtClean="0"/>
               <a:t>os</a:t>
             </a:r>
             <a:r>
               <a:rPr lang="en-US" dirty="0" smtClean="0"/>
-              <a:t> dados  </a:t>
-            </a:r>
-            <a:r>
-              <a:rPr lang="en-US" dirty="0" err="1"/>
+              <a:t> </a:t>
+            </a:r>
+            <a:r>
+              <a:rPr lang="en-US" dirty="0" smtClean="0"/>
+              <a:t>dados  </a:t>
+            </a:r>
+            <a:r>
+              <a:rPr lang="pt-BR" dirty="0" smtClean="0"/>
               <a:t>são</a:t>
             </a:r>
             <a:r>
-              <a:rPr lang="en-US" dirty="0"/>
+              <a:rPr lang="en-US" dirty="0" smtClean="0"/>
               <a:t> </a:t>
             </a:r>
             <a:r>
-              <a:rPr lang="en-US" dirty="0" err="1"/>
+              <a:rPr lang="pt-BR" dirty="0" smtClean="0"/>
               <a:t>representados</a:t>
             </a:r>
             <a:r>
-              <a:rPr lang="en-US" dirty="0"/>
+              <a:rPr lang="en-US" dirty="0" smtClean="0"/>
               <a:t>?</a:t>
             </a:r>
             <a:endParaRPr lang="pt-BR" dirty="0"/>
@@ -8156,7 +8078,12 @@
             <p:ph idx="1"/>
           </p:nvPr>
         </p:nvSpPr>
-        <p:spPr/>
+        <p:spPr>
+          <a:xfrm>
+            <a:off x="822960" y="1217303"/>
+            <a:ext cx="7520940" cy="3579849"/>
+          </a:xfrm>
+        </p:spPr>
         <p:txBody>
           <a:bodyPr/>
           <a:lstStyle/>
@@ -8173,24 +8100,24 @@
               <a:buChar char="-"/>
             </a:pPr>
             <a:r>
-              <a:rPr lang="en-US" sz="3600" b="0" dirty="0" err="1"/>
-              <a:t>M</a:t>
-            </a:r>
-            <a:r>
-              <a:rPr lang="en-US" sz="3600" b="0" dirty="0" err="1" smtClean="0"/>
-              <a:t>atricial</a:t>
+              <a:rPr lang="pt-BR" sz="3600" b="0" dirty="0" smtClean="0"/>
+              <a:t>Matricial</a:t>
             </a:r>
             <a:r>
               <a:rPr lang="en-US" sz="3600" b="0" dirty="0" smtClean="0"/>
               <a:t> </a:t>
             </a:r>
             <a:r>
-              <a:rPr lang="en-US" sz="3600" b="0" dirty="0" err="1" smtClean="0"/>
+              <a:rPr lang="pt-BR" sz="3600" b="0" dirty="0" smtClean="0"/>
               <a:t>ou</a:t>
             </a:r>
             <a:r>
               <a:rPr lang="en-US" sz="3600" b="0" dirty="0" smtClean="0"/>
-              <a:t> raster</a:t>
+              <a:t> </a:t>
+            </a:r>
+            <a:r>
+              <a:rPr lang="en-US" sz="3600" b="0" dirty="0" smtClean="0"/>
+              <a:t>raster</a:t>
             </a:r>
           </a:p>
           <a:p>
@@ -8206,12 +8133,8 @@
               <a:buChar char="-"/>
             </a:pPr>
             <a:r>
-              <a:rPr lang="en-US" sz="3600" b="0" dirty="0" err="1"/>
-              <a:t>V</a:t>
-            </a:r>
-            <a:r>
-              <a:rPr lang="en-US" sz="3600" b="0" dirty="0" err="1" smtClean="0"/>
-              <a:t>etorial</a:t>
+              <a:rPr lang="pt-BR" sz="3600" b="0" dirty="0" smtClean="0"/>
+              <a:t>Vetorial</a:t>
             </a:r>
             <a:r>
               <a:rPr lang="en-US" sz="3600" b="0" dirty="0" smtClean="0"/>
@@ -8277,15 +8200,15 @@
           <a:lstStyle/>
           <a:p>
             <a:r>
-              <a:rPr lang="en-US" dirty="0" err="1"/>
+              <a:rPr lang="pt-BR" dirty="0" smtClean="0"/>
               <a:t>Representação</a:t>
             </a:r>
             <a:r>
-              <a:rPr lang="en-US" dirty="0"/>
+              <a:rPr lang="en-US" dirty="0" smtClean="0"/>
               <a:t> </a:t>
             </a:r>
             <a:r>
-              <a:rPr lang="en-US" dirty="0" err="1"/>
+              <a:rPr lang="pt-BR" dirty="0" smtClean="0"/>
               <a:t>matricial</a:t>
             </a:r>
             <a:endParaRPr lang="pt-BR" dirty="0"/>
@@ -8434,15 +8357,15 @@
           <a:lstStyle/>
           <a:p>
             <a:r>
-              <a:rPr lang="en-US" dirty="0" err="1"/>
+              <a:rPr lang="pt-BR" dirty="0" smtClean="0"/>
               <a:t>Representação</a:t>
             </a:r>
             <a:r>
-              <a:rPr lang="en-US" dirty="0"/>
+              <a:rPr lang="en-US" dirty="0" smtClean="0"/>
               <a:t> </a:t>
             </a:r>
             <a:r>
-              <a:rPr lang="en-US" dirty="0" err="1"/>
+              <a:rPr lang="pt-BR" dirty="0" smtClean="0"/>
               <a:t>vetorial</a:t>
             </a:r>
             <a:endParaRPr lang="pt-BR" dirty="0"/>
@@ -8472,11 +8395,7 @@
           <a:p>
             <a:r>
               <a:rPr lang="pt-BR" sz="2800" b="0" dirty="0"/>
-              <a:t>	</a:t>
-            </a:r>
-            <a:r>
-              <a:rPr lang="pt-BR" sz="2800" b="0" dirty="0"/>
-              <a:t>U</a:t>
+              <a:t>	U</a:t>
             </a:r>
             <a:r>
               <a:rPr lang="pt-BR" sz="2800" b="0" dirty="0" smtClean="0"/>
@@ -8554,27 +8473,35 @@
           <a:lstStyle/>
           <a:p>
             <a:r>
-              <a:rPr lang="en-US" sz="2400" dirty="0" err="1"/>
+              <a:rPr lang="pt-BR" sz="2400" dirty="0" smtClean="0"/>
               <a:t>Vantagens</a:t>
             </a:r>
             <a:r>
+              <a:rPr lang="en-US" sz="2400" dirty="0" smtClean="0"/>
+              <a:t> </a:t>
+            </a:r>
+            <a:r>
               <a:rPr lang="en-US" sz="2400" dirty="0"/>
-              <a:t> de </a:t>
-            </a:r>
-            <a:r>
-              <a:rPr lang="en-US" sz="2400" dirty="0" err="1"/>
+              <a:t>de </a:t>
+            </a:r>
+            <a:r>
+              <a:rPr lang="pt-BR" sz="2400" dirty="0" smtClean="0"/>
               <a:t>bancos</a:t>
             </a:r>
             <a:r>
+              <a:rPr lang="en-US" sz="2400" dirty="0" smtClean="0"/>
+              <a:t> </a:t>
+            </a:r>
+            <a:r>
               <a:rPr lang="en-US" sz="2400" dirty="0"/>
-              <a:t> de </a:t>
+              <a:t>de </a:t>
             </a:r>
             <a:r>
               <a:rPr lang="en-US" sz="2400" dirty="0" smtClean="0"/>
               <a:t>dados </a:t>
             </a:r>
             <a:r>
-              <a:rPr lang="en-US" sz="2400" dirty="0" err="1" smtClean="0"/>
+              <a:rPr lang="pt-BR" sz="2400" dirty="0" err="1" smtClean="0"/>
               <a:t>geografico</a:t>
             </a:r>
             <a:endParaRPr lang="pt-BR" sz="2400" dirty="0"/>
@@ -8608,7 +8535,7 @@
               <a:t> </a:t>
             </a:r>
             <a:r>
-              <a:rPr lang="en-US" sz="1800" b="0" dirty="0" err="1" smtClean="0"/>
+              <a:rPr lang="pt-BR" sz="1800" b="0" dirty="0" smtClean="0"/>
               <a:t>Uso</a:t>
             </a:r>
             <a:r>
@@ -8620,28 +8547,20 @@
               <a:t>de </a:t>
             </a:r>
             <a:r>
-              <a:rPr lang="en-US" sz="1800" b="0" dirty="0" err="1"/>
+              <a:rPr lang="pt-BR" sz="1800" b="0" dirty="0" smtClean="0"/>
               <a:t>expressões</a:t>
             </a:r>
             <a:r>
+              <a:rPr lang="en-US" sz="1800" b="0" dirty="0" smtClean="0"/>
+              <a:t> </a:t>
+            </a:r>
+            <a:r>
               <a:rPr lang="en-US" sz="1800" b="0" dirty="0"/>
-              <a:t> SQL simples </a:t>
-            </a:r>
-            <a:r>
-              <a:rPr lang="en-US" sz="1800" b="0" dirty="0" err="1"/>
-              <a:t>para</a:t>
-            </a:r>
-            <a:r>
-              <a:rPr lang="en-US" sz="1800" b="0" dirty="0"/>
-              <a:t> </a:t>
-            </a:r>
-            <a:r>
-              <a:rPr lang="en-US" sz="1800" b="0" dirty="0" err="1" smtClean="0"/>
-              <a:t>determinar</a:t>
-            </a:r>
-            <a:r>
-              <a:rPr lang="en-US" sz="1800" b="0" dirty="0" smtClean="0"/>
-              <a:t>:</a:t>
+              <a:t>SQL simples </a:t>
+            </a:r>
+            <a:r>
+              <a:rPr lang="pt-BR" sz="1800" b="0" dirty="0" smtClean="0"/>
+              <a:t>para determinar:</a:t>
             </a:r>
           </a:p>
           <a:p>
@@ -8653,10 +8572,9 @@
               <a:buChar char="-"/>
             </a:pPr>
             <a:r>
-              <a:rPr lang="en-US" sz="1800" b="0" dirty="0" err="1" smtClean="0"/>
+              <a:rPr lang="pt-BR" sz="1800" b="0" dirty="0" smtClean="0"/>
               <a:t>Distância</a:t>
             </a:r>
-            <a:endParaRPr lang="en-US" sz="1800" b="0" dirty="0" smtClean="0"/>
           </a:p>
           <a:p>
             <a:pPr>
@@ -8664,16 +8582,8 @@
               <a:buChar char="-"/>
             </a:pPr>
             <a:r>
-              <a:rPr lang="en-US" sz="1800" b="0" dirty="0" err="1"/>
-              <a:t>O</a:t>
-            </a:r>
-            <a:r>
-              <a:rPr lang="en-US" sz="1800" b="0" dirty="0" err="1" smtClean="0"/>
-              <a:t>rdem</a:t>
-            </a:r>
-            <a:r>
-              <a:rPr lang="en-US" sz="1800" b="0" dirty="0" smtClean="0"/>
-              <a:t> </a:t>
+              <a:rPr lang="pt-BR" sz="1800" b="0" dirty="0" smtClean="0"/>
+              <a:t>Ordem </a:t>
             </a:r>
           </a:p>
           <a:p>
@@ -8682,10 +8592,9 @@
               <a:buChar char="-"/>
             </a:pPr>
             <a:r>
-              <a:rPr lang="en-US" sz="1800" b="0" dirty="0" err="1" smtClean="0"/>
-              <a:t>Topológia</a:t>
-            </a:r>
-            <a:endParaRPr lang="en-US" sz="1800" b="0" dirty="0" smtClean="0"/>
+              <a:rPr lang="pt-BR" sz="1800" b="0" dirty="0" smtClean="0"/>
+              <a:t>Topologia</a:t>
+            </a:r>
           </a:p>
           <a:p>
             <a:pPr>
@@ -8693,27 +8602,15 @@
               <a:buChar char="-"/>
             </a:pPr>
             <a:r>
-              <a:rPr lang="en-US" sz="1800" b="0" dirty="0" err="1"/>
-              <a:t>Á</a:t>
-            </a:r>
-            <a:r>
-              <a:rPr lang="en-US" sz="1800" b="0" dirty="0" err="1" smtClean="0"/>
-              <a:t>rea</a:t>
-            </a:r>
-            <a:r>
-              <a:rPr lang="en-US" sz="1800" b="0" dirty="0" smtClean="0"/>
-              <a:t> </a:t>
-            </a:r>
-            <a:r>
-              <a:rPr lang="en-US" sz="1800" b="0" dirty="0"/>
-              <a:t>(</a:t>
-            </a:r>
-            <a:r>
-              <a:rPr lang="en-US" sz="1800" b="0" i="1" dirty="0" smtClean="0"/>
-              <a:t>area</a:t>
-            </a:r>
-            <a:r>
-              <a:rPr lang="en-US" sz="1800" b="0" dirty="0" smtClean="0"/>
+              <a:rPr lang="pt-BR" sz="1800" b="0" dirty="0" smtClean="0"/>
+              <a:t>Área (</a:t>
+            </a:r>
+            <a:r>
+              <a:rPr lang="pt-BR" sz="1800" b="0" i="1" dirty="0" smtClean="0"/>
+              <a:t>área</a:t>
+            </a:r>
+            <a:r>
+              <a:rPr lang="pt-BR" sz="1800" b="0" dirty="0" smtClean="0"/>
               <a:t>)</a:t>
             </a:r>
           </a:p>
@@ -8723,16 +8620,8 @@
               <a:buChar char="-"/>
             </a:pPr>
             <a:r>
-              <a:rPr lang="en-US" sz="1800" b="0" dirty="0" err="1"/>
-              <a:t>C</a:t>
-            </a:r>
-            <a:r>
-              <a:rPr lang="en-US" sz="1800" b="0" dirty="0" err="1" smtClean="0"/>
-              <a:t>omprimento</a:t>
-            </a:r>
-            <a:r>
-              <a:rPr lang="en-US" sz="1800" b="0" dirty="0" smtClean="0"/>
-              <a:t> </a:t>
+              <a:rPr lang="pt-BR" sz="1800" b="0" dirty="0" smtClean="0"/>
+              <a:t>Comprimento </a:t>
             </a:r>
           </a:p>
           <a:p>
@@ -8741,16 +8630,8 @@
               <a:buChar char="-"/>
             </a:pPr>
             <a:r>
-              <a:rPr lang="en-US" sz="1800" b="0" dirty="0" err="1"/>
-              <a:t>I</a:t>
-            </a:r>
-            <a:r>
-              <a:rPr lang="en-US" sz="1800" b="0" dirty="0" err="1" smtClean="0"/>
-              <a:t>ntersecção</a:t>
-            </a:r>
-            <a:r>
-              <a:rPr lang="en-US" sz="1800" b="0" dirty="0" smtClean="0"/>
-              <a:t> </a:t>
+              <a:rPr lang="pt-BR" sz="1800" b="0" dirty="0" smtClean="0"/>
+              <a:t>Intersecção </a:t>
             </a:r>
           </a:p>
           <a:p>
@@ -8759,16 +8640,8 @@
               <a:buChar char="-"/>
             </a:pPr>
             <a:r>
-              <a:rPr lang="en-US" sz="1800" b="0" dirty="0" err="1"/>
-              <a:t>U</a:t>
-            </a:r>
-            <a:r>
-              <a:rPr lang="en-US" sz="1800" b="0" dirty="0" err="1" smtClean="0"/>
-              <a:t>nião</a:t>
-            </a:r>
-            <a:r>
-              <a:rPr lang="en-US" sz="1800" b="0" dirty="0" smtClean="0"/>
-              <a:t> </a:t>
+              <a:rPr lang="pt-BR" sz="1800" b="0" dirty="0" smtClean="0"/>
+              <a:t>União </a:t>
             </a:r>
           </a:p>
           <a:p>
@@ -8777,14 +8650,9 @@
               <a:buChar char="-"/>
             </a:pPr>
             <a:r>
-              <a:rPr lang="en-US" sz="1800" b="0" dirty="0"/>
-              <a:t>B</a:t>
-            </a:r>
-            <a:r>
-              <a:rPr lang="en-US" sz="1800" b="0" dirty="0" smtClean="0"/>
-              <a:t>uffer </a:t>
-            </a:r>
-            <a:endParaRPr lang="en-US" sz="1800" b="0" dirty="0"/>
+              <a:rPr lang="pt-BR" sz="1800" b="0" dirty="0" smtClean="0"/>
+              <a:t>Buffer </a:t>
+            </a:r>
           </a:p>
           <a:p>
             <a:pPr>
@@ -8851,28 +8719,8 @@
           <a:lstStyle/>
           <a:p>
             <a:r>
-              <a:rPr lang="en-US" dirty="0" err="1"/>
-              <a:t>Alguns</a:t>
-            </a:r>
-            <a:r>
-              <a:rPr lang="en-US" dirty="0"/>
-              <a:t> </a:t>
-            </a:r>
-            <a:r>
-              <a:rPr lang="en-US" dirty="0" err="1"/>
-              <a:t>bancos</a:t>
-            </a:r>
-            <a:r>
-              <a:rPr lang="en-US" dirty="0"/>
-              <a:t> de </a:t>
-            </a:r>
-            <a:r>
-              <a:rPr lang="en-US" dirty="0" smtClean="0"/>
-              <a:t>dados </a:t>
-            </a:r>
-            <a:r>
-              <a:rPr lang="en-US" dirty="0" err="1" smtClean="0"/>
-              <a:t>Geograficos</a:t>
+              <a:rPr lang="pt-BR" dirty="0" smtClean="0"/>
+              <a:t>Alguns bancos de dados Geográficos</a:t>
             </a:r>
             <a:endParaRPr lang="pt-BR" dirty="0"/>
           </a:p>
@@ -8891,7 +8739,7 @@
         <p:spPr/>
         <p:txBody>
           <a:bodyPr>
-            <a:normAutofit fontScale="92500" lnSpcReduction="10000"/>
+            <a:normAutofit fontScale="92500" lnSpcReduction="20000"/>
           </a:bodyPr>
           <a:lstStyle/>
           <a:p>
@@ -8913,9 +8761,14 @@
               <a:buChar char="-"/>
             </a:pPr>
             <a:r>
-              <a:rPr lang="en-US" sz="2800" b="0" dirty="0" smtClean="0"/>
-              <a:t>Oracle Spatial</a:t>
-            </a:r>
+              <a:rPr lang="pt-BR" sz="2800" b="0" dirty="0" smtClean="0"/>
+              <a:t>Oracle </a:t>
+            </a:r>
+            <a:r>
+              <a:rPr lang="pt-BR" sz="2800" b="0" dirty="0" err="1" smtClean="0"/>
+              <a:t>Spatial</a:t>
+            </a:r>
+            <a:endParaRPr lang="pt-BR" sz="2800" b="0" dirty="0" smtClean="0"/>
           </a:p>
           <a:p>
             <a:pPr marL="454025" indent="-339725">
@@ -8925,7 +8778,7 @@
               <a:buFontTx/>
               <a:buChar char="-"/>
             </a:pPr>
-            <a:endParaRPr lang="en-US" sz="2800" b="0" dirty="0" smtClean="0"/>
+            <a:endParaRPr lang="pt-BR" sz="2800" b="0" dirty="0" smtClean="0"/>
           </a:p>
           <a:p>
             <a:pPr marL="454025" indent="-339725">
@@ -8936,16 +8789,16 @@
               <a:buChar char="-"/>
             </a:pPr>
             <a:r>
-              <a:rPr lang="en-US" sz="2800" b="0" dirty="0" smtClean="0"/>
-              <a:t>MS </a:t>
-            </a:r>
-            <a:r>
-              <a:rPr lang="en-US" sz="2800" b="0" dirty="0"/>
-              <a:t>SQL Server (</a:t>
-            </a:r>
-            <a:r>
-              <a:rPr lang="en-US" sz="2800" b="0" dirty="0" smtClean="0"/>
-              <a:t>with ESRI SDE)</a:t>
+              <a:rPr lang="pt-BR" sz="2800" b="0" dirty="0" smtClean="0"/>
+              <a:t>MS SQL Server (</a:t>
+            </a:r>
+            <a:r>
+              <a:rPr lang="pt-BR" sz="2800" b="0" dirty="0" err="1" smtClean="0"/>
+              <a:t>with</a:t>
+            </a:r>
+            <a:r>
+              <a:rPr lang="pt-BR" sz="2800" b="0" dirty="0" smtClean="0"/>
+              <a:t> ESRI SDE)</a:t>
             </a:r>
           </a:p>
           <a:p>
@@ -8956,7 +8809,7 @@
               <a:buFontTx/>
               <a:buChar char="-"/>
             </a:pPr>
-            <a:endParaRPr lang="en-US" sz="2800" b="0" dirty="0" smtClean="0"/>
+            <a:endParaRPr lang="pt-BR" sz="2800" b="0" dirty="0" smtClean="0"/>
           </a:p>
           <a:p>
             <a:pPr marL="454025" indent="-339725">
@@ -8967,20 +8820,20 @@
               <a:buChar char="-"/>
             </a:pPr>
             <a:r>
-              <a:rPr lang="en-US" sz="2800" b="0" dirty="0" err="1" smtClean="0"/>
+              <a:rPr lang="pt-BR" sz="2800" b="0" dirty="0" err="1" smtClean="0"/>
               <a:t>Geomedia</a:t>
             </a:r>
             <a:r>
-              <a:rPr lang="en-US" sz="2800" b="0" dirty="0" smtClean="0"/>
+              <a:rPr lang="pt-BR" sz="2800" b="0" dirty="0" smtClean="0"/>
               <a:t> </a:t>
             </a:r>
             <a:r>
-              <a:rPr lang="en-US" sz="2800" b="0" dirty="0"/>
-              <a:t>on MS </a:t>
-            </a:r>
-            <a:r>
-              <a:rPr lang="en-US" sz="2800" b="0" dirty="0" smtClean="0"/>
-              <a:t>Access</a:t>
+              <a:rPr lang="pt-BR" sz="2800" b="0" dirty="0" err="1" smtClean="0"/>
+              <a:t>on</a:t>
+            </a:r>
+            <a:r>
+              <a:rPr lang="pt-BR" sz="2800" b="0" dirty="0" smtClean="0"/>
+              <a:t> MS Access</a:t>
             </a:r>
           </a:p>
           <a:p>
@@ -8991,7 +8844,7 @@
               <a:buFontTx/>
               <a:buChar char="-"/>
             </a:pPr>
-            <a:endParaRPr lang="en-US" sz="2800" b="0" dirty="0" smtClean="0"/>
+            <a:endParaRPr lang="pt-BR" sz="2800" b="0" dirty="0" smtClean="0"/>
           </a:p>
           <a:p>
             <a:pPr marL="454025" indent="-339725">
@@ -9002,26 +8855,21 @@
               <a:buChar char="-"/>
             </a:pPr>
             <a:r>
-              <a:rPr lang="en-US" sz="2800" b="0" dirty="0" err="1" smtClean="0"/>
+              <a:rPr lang="pt-BR" sz="2800" b="0" dirty="0" err="1" smtClean="0"/>
               <a:t>PostGIS</a:t>
             </a:r>
             <a:r>
-              <a:rPr lang="en-US" sz="2800" b="0" dirty="0" smtClean="0"/>
-              <a:t> </a:t>
-            </a:r>
-            <a:r>
-              <a:rPr lang="en-US" sz="2800" b="0" dirty="0"/>
-              <a:t>/ </a:t>
-            </a:r>
-            <a:r>
-              <a:rPr lang="en-US" sz="2800" b="0" dirty="0" err="1" smtClean="0"/>
+              <a:rPr lang="pt-BR" sz="2800" b="0" dirty="0" smtClean="0"/>
+              <a:t> / </a:t>
+            </a:r>
+            <a:r>
+              <a:rPr lang="pt-BR" sz="2800" b="0" dirty="0" err="1" smtClean="0"/>
               <a:t>PostgreSQL</a:t>
             </a:r>
             <a:r>
-              <a:rPr lang="en-US" sz="2800" b="0" dirty="0" smtClean="0"/>
+              <a:rPr lang="pt-BR" sz="2800" b="0" dirty="0" smtClean="0"/>
               <a:t>(ADOTADO PELO GRUPO)</a:t>
             </a:r>
-            <a:endParaRPr lang="en-US" sz="2800" b="0" dirty="0"/>
           </a:p>
           <a:p>
             <a:endParaRPr lang="pt-BR" dirty="0"/>

</xml_diff>

<commit_message>
atualização do diagrama de CLASSE C. H. V..jpg e relatório.
</commit_message>
<xml_diff>
--- a/Banco Geográfico/BANCO DE DADOS GEOGRAFICO.pptx
+++ b/Banco Geográfico/BANCO DE DADOS GEOGRAFICO.pptx
@@ -594,7 +594,7 @@
           <a:p>
             <a:fld id="{97BE2B42-0DA1-40E8-94A4-D339D326FD35}" type="datetimeFigureOut">
               <a:rPr lang="pt-BR" smtClean="0"/>
-              <a:t>07/10/2012</a:t>
+              <a:t>08/10/2012</a:t>
             </a:fld>
             <a:endParaRPr lang="pt-BR"/>
           </a:p>
@@ -759,7 +759,7 @@
           <a:p>
             <a:fld id="{97BE2B42-0DA1-40E8-94A4-D339D326FD35}" type="datetimeFigureOut">
               <a:rPr lang="pt-BR" smtClean="0"/>
-              <a:t>07/10/2012</a:t>
+              <a:t>08/10/2012</a:t>
             </a:fld>
             <a:endParaRPr lang="pt-BR"/>
           </a:p>
@@ -934,7 +934,7 @@
           <a:p>
             <a:fld id="{97BE2B42-0DA1-40E8-94A4-D339D326FD35}" type="datetimeFigureOut">
               <a:rPr lang="pt-BR" smtClean="0"/>
-              <a:t>07/10/2012</a:t>
+              <a:t>08/10/2012</a:t>
             </a:fld>
             <a:endParaRPr lang="pt-BR"/>
           </a:p>
@@ -1099,7 +1099,7 @@
           <a:p>
             <a:fld id="{97BE2B42-0DA1-40E8-94A4-D339D326FD35}" type="datetimeFigureOut">
               <a:rPr lang="pt-BR" smtClean="0"/>
-              <a:t>07/10/2012</a:t>
+              <a:t>08/10/2012</a:t>
             </a:fld>
             <a:endParaRPr lang="pt-BR"/>
           </a:p>
@@ -1652,7 +1652,7 @@
           <a:p>
             <a:fld id="{97BE2B42-0DA1-40E8-94A4-D339D326FD35}" type="datetimeFigureOut">
               <a:rPr lang="pt-BR" smtClean="0"/>
-              <a:t>07/10/2012</a:t>
+              <a:t>08/10/2012</a:t>
             </a:fld>
             <a:endParaRPr lang="pt-BR"/>
           </a:p>
@@ -1912,7 +1912,7 @@
           <a:p>
             <a:fld id="{97BE2B42-0DA1-40E8-94A4-D339D326FD35}" type="datetimeFigureOut">
               <a:rPr lang="pt-BR" smtClean="0"/>
-              <a:t>07/10/2012</a:t>
+              <a:t>08/10/2012</a:t>
             </a:fld>
             <a:endParaRPr lang="pt-BR"/>
           </a:p>
@@ -2400,7 +2400,7 @@
           <a:p>
             <a:fld id="{97BE2B42-0DA1-40E8-94A4-D339D326FD35}" type="datetimeFigureOut">
               <a:rPr lang="pt-BR" smtClean="0"/>
-              <a:t>07/10/2012</a:t>
+              <a:t>08/10/2012</a:t>
             </a:fld>
             <a:endParaRPr lang="pt-BR"/>
           </a:p>
@@ -2513,7 +2513,7 @@
           <a:p>
             <a:fld id="{97BE2B42-0DA1-40E8-94A4-D339D326FD35}" type="datetimeFigureOut">
               <a:rPr lang="pt-BR" smtClean="0"/>
-              <a:t>07/10/2012</a:t>
+              <a:t>08/10/2012</a:t>
             </a:fld>
             <a:endParaRPr lang="pt-BR"/>
           </a:p>
@@ -2603,7 +2603,7 @@
           <a:p>
             <a:fld id="{97BE2B42-0DA1-40E8-94A4-D339D326FD35}" type="datetimeFigureOut">
               <a:rPr lang="pt-BR" smtClean="0"/>
-              <a:t>07/10/2012</a:t>
+              <a:t>08/10/2012</a:t>
             </a:fld>
             <a:endParaRPr lang="pt-BR"/>
           </a:p>
@@ -3033,7 +3033,7 @@
           <a:p>
             <a:fld id="{97BE2B42-0DA1-40E8-94A4-D339D326FD35}" type="datetimeFigureOut">
               <a:rPr lang="pt-BR" smtClean="0"/>
-              <a:t>07/10/2012</a:t>
+              <a:t>08/10/2012</a:t>
             </a:fld>
             <a:endParaRPr lang="pt-BR"/>
           </a:p>
@@ -3566,7 +3566,7 @@
           <a:p>
             <a:fld id="{97BE2B42-0DA1-40E8-94A4-D339D326FD35}" type="datetimeFigureOut">
               <a:rPr lang="pt-BR" smtClean="0"/>
-              <a:t>07/10/2012</a:t>
+              <a:t>08/10/2012</a:t>
             </a:fld>
             <a:endParaRPr lang="pt-BR"/>
           </a:p>
@@ -4406,7 +4406,7 @@
           <a:p>
             <a:fld id="{97BE2B42-0DA1-40E8-94A4-D339D326FD35}" type="datetimeFigureOut">
               <a:rPr lang="pt-BR" smtClean="0"/>
-              <a:t>07/10/2012</a:t>
+              <a:t>08/10/2012</a:t>
             </a:fld>
             <a:endParaRPr lang="pt-BR"/>
           </a:p>
@@ -5897,11 +5897,7 @@
           <a:p>
             <a:r>
               <a:rPr lang="pt-BR" dirty="0" smtClean="0"/>
-              <a:t>Criando um banco de dados </a:t>
-            </a:r>
-            <a:r>
-              <a:rPr lang="pt-BR" dirty="0" smtClean="0"/>
-              <a:t>geográfico</a:t>
+              <a:t>Criando um banco de dados geográfico</a:t>
             </a:r>
             <a:endParaRPr lang="pt-BR" dirty="0"/>
           </a:p>
@@ -6628,7 +6624,23 @@
                   <a:srgbClr val="00B050"/>
                 </a:solidFill>
               </a:rPr>
-              <a:t>						a </a:t>
+              <a:t>					</a:t>
+            </a:r>
+            <a:r>
+              <a:rPr lang="pt-BR" b="0" smtClean="0">
+                <a:solidFill>
+                  <a:srgbClr val="00B050"/>
+                </a:solidFill>
+              </a:rPr>
+              <a:t>	</a:t>
+            </a:r>
+            <a:r>
+              <a:rPr lang="pt-BR" b="0" smtClean="0">
+                <a:solidFill>
+                  <a:srgbClr val="00B050"/>
+                </a:solidFill>
+              </a:rPr>
+              <a:t>à </a:t>
             </a:r>
             <a:r>
               <a:rPr lang="pt-BR" b="0" dirty="0">
@@ -7659,45 +7671,20 @@
             </a:r>
             <a:r>
               <a:rPr lang="en-US" sz="2000" b="0" dirty="0" smtClean="0"/>
-              <a:t> </a:t>
-            </a:r>
-            <a:r>
-              <a:rPr lang="en-US" sz="2000" b="0" dirty="0" smtClean="0"/>
-              <a:t>e </a:t>
-            </a:r>
-            <a:r>
-              <a:rPr lang="en-US" sz="2000" b="0" dirty="0" smtClean="0"/>
-              <a:t>prove </a:t>
+              <a:t> e prove </a:t>
             </a:r>
             <a:r>
               <a:rPr lang="pt-BR" sz="2000" b="0" dirty="0" smtClean="0"/>
               <a:t>operações para manipulação de objetos geográficos.</a:t>
             </a:r>
+          </a:p>
+          <a:p>
             <a:endParaRPr lang="pt-BR" sz="2000" b="0" dirty="0" smtClean="0"/>
           </a:p>
           <a:p>
-            <a:endParaRPr lang="pt-BR" sz="2000" b="0" dirty="0" smtClean="0"/>
-          </a:p>
-          <a:p>
             <a:r>
               <a:rPr lang="pt-BR" sz="2000" b="0" dirty="0" smtClean="0"/>
-              <a:t>Obs.: </a:t>
-            </a:r>
-            <a:r>
-              <a:rPr lang="pt-BR" sz="2000" b="0" dirty="0" smtClean="0"/>
-              <a:t>Ele </a:t>
-            </a:r>
-            <a:r>
-              <a:rPr lang="pt-BR" sz="2000" b="0" dirty="0" smtClean="0"/>
-              <a:t>também </a:t>
-            </a:r>
-            <a:r>
-              <a:rPr lang="pt-BR" sz="2000" b="0" dirty="0" smtClean="0"/>
-              <a:t>manipula e armazena outros objetos do banco de </a:t>
-            </a:r>
-            <a:r>
-              <a:rPr lang="pt-BR" sz="2000" b="0" dirty="0" smtClean="0"/>
-              <a:t>dados.</a:t>
+              <a:t>Obs.: Ele também manipula e armazena outros objetos do banco de dados.</a:t>
             </a:r>
             <a:endParaRPr lang="pt-BR" sz="2000" b="0" dirty="0"/>
           </a:p>
@@ -8042,11 +8029,7 @@
             </a:r>
             <a:r>
               <a:rPr lang="en-US" dirty="0" smtClean="0"/>
-              <a:t> </a:t>
-            </a:r>
-            <a:r>
-              <a:rPr lang="en-US" dirty="0" smtClean="0"/>
-              <a:t>dados  </a:t>
+              <a:t> dados  </a:t>
             </a:r>
             <a:r>
               <a:rPr lang="pt-BR" dirty="0" smtClean="0"/>
@@ -8113,11 +8096,7 @@
             </a:r>
             <a:r>
               <a:rPr lang="en-US" sz="3600" b="0" dirty="0" smtClean="0"/>
-              <a:t> </a:t>
-            </a:r>
-            <a:r>
-              <a:rPr lang="en-US" sz="3600" b="0" dirty="0" smtClean="0"/>
-              <a:t>raster</a:t>
+              <a:t> raster</a:t>
             </a:r>
           </a:p>
           <a:p>

</xml_diff>